<commit_message>
Add LLM-driven PPT generation and CLI flags
Introduce LLM-powered text rewriting and UX improvements for PowerPoint generation. Key changes: add scripts/test_llm_api.py for quick LLM API checks; extend README with PPT usage, template description and LLM modes; add/update data assets (template and image). CLI: new --llm and --llm-log flags, environment toggles, LLM status reporting, PPT-only flow improvements, automatic PPT opening. Model builder: track per-team member charges and roles. draw.io: small UI text tweak for AI badge. Major refactor of ppt_generator: add LLM rewrite/caching/prefetch, concurrency for prefetching, spinner and log modes, get_llm_status helper, richer text handling and formatting, and pass frag_df through PPT generation.
</commit_message>
<xml_diff>
--- a/data/template.ppt.pptx
+++ b/data/template.ppt.pptx
@@ -5,12 +5,16 @@
     <p:sldMasterId id="2147483729" r:id="rId1"/>
   </p:sldMasterIdLst>
   <p:notesMasterIdLst>
-    <p:notesMasterId r:id="rId5"/>
+    <p:notesMasterId r:id="rId9"/>
   </p:notesMasterIdLst>
   <p:sldIdLst>
     <p:sldId id="256" r:id="rId2"/>
     <p:sldId id="257" r:id="rId3"/>
     <p:sldId id="258" r:id="rId4"/>
+    <p:sldId id="259" r:id="rId5"/>
+    <p:sldId id="260" r:id="rId6"/>
+    <p:sldId id="261" r:id="rId7"/>
+    <p:sldId id="262" r:id="rId8"/>
   </p:sldIdLst>
   <p:sldSz cx="12192000" cy="6858000"/>
   <p:notesSz cx="12192000" cy="6858000"/>
@@ -782,6 +786,42 @@
           </p:txBody>
         </p:sp>
       </p:grpSp>
+      <p:pic>
+        <p:nvPicPr>
+          <p:cNvPr id="2" name="Image 1" descr="Une image contenant dessin humoristique, smiley, émoticône&#10;&#10;Le contenu généré par l’IA peut être incorrect.">
+            <a:extLst>
+              <a:ext uri="{FF2B5EF4-FFF2-40B4-BE49-F238E27FC236}">
+                <a16:creationId xmlns:a16="http://schemas.microsoft.com/office/drawing/2014/main" id="{F01368AF-42A1-DC9A-A258-D2FF5E8334C6}"/>
+              </a:ext>
+            </a:extLst>
+          </p:cNvPr>
+          <p:cNvPicPr>
+            <a:picLocks noChangeAspect="1"/>
+          </p:cNvPicPr>
+          <p:nvPr userDrawn="1"/>
+        </p:nvPicPr>
+        <p:blipFill>
+          <a:blip r:embed="rId2" cstate="email">
+            <a:extLst>
+              <a:ext uri="{28A0092B-C50C-407E-A947-70E740481C1C}">
+                <a14:useLocalDpi xmlns:a14="http://schemas.microsoft.com/office/drawing/2010/main"/>
+              </a:ext>
+            </a:extLst>
+          </a:blip>
+          <a:stretch>
+            <a:fillRect/>
+          </a:stretch>
+        </p:blipFill>
+        <p:spPr>
+          <a:xfrm>
+            <a:off x="0" y="5839691"/>
+            <a:ext cx="1018309" cy="1018309"/>
+          </a:xfrm>
+          <a:prstGeom prst="rect">
+            <a:avLst/>
+          </a:prstGeom>
+        </p:spPr>
+      </p:pic>
     </p:spTree>
     <p:extLst>
       <p:ext uri="{BB962C8B-B14F-4D97-AF65-F5344CB8AC3E}">
@@ -964,6 +1004,42 @@
           </a:p>
         </p:txBody>
       </p:sp>
+      <p:pic>
+        <p:nvPicPr>
+          <p:cNvPr id="5" name="Image 4" descr="Une image contenant dessin humoristique, smiley, émoticône&#10;&#10;Le contenu généré par l’IA peut être incorrect.">
+            <a:extLst>
+              <a:ext uri="{FF2B5EF4-FFF2-40B4-BE49-F238E27FC236}">
+                <a16:creationId xmlns:a16="http://schemas.microsoft.com/office/drawing/2014/main" id="{B2519EE3-BF8B-3F35-6F3C-2AEF3B409A98}"/>
+              </a:ext>
+            </a:extLst>
+          </p:cNvPr>
+          <p:cNvPicPr>
+            <a:picLocks noChangeAspect="1"/>
+          </p:cNvPicPr>
+          <p:nvPr userDrawn="1"/>
+        </p:nvPicPr>
+        <p:blipFill>
+          <a:blip r:embed="rId2" cstate="email">
+            <a:extLst>
+              <a:ext uri="{28A0092B-C50C-407E-A947-70E740481C1C}">
+                <a14:useLocalDpi xmlns:a14="http://schemas.microsoft.com/office/drawing/2010/main"/>
+              </a:ext>
+            </a:extLst>
+          </a:blip>
+          <a:stretch>
+            <a:fillRect/>
+          </a:stretch>
+        </p:blipFill>
+        <p:spPr>
+          <a:xfrm>
+            <a:off x="127000" y="1800225"/>
+            <a:ext cx="3257549" cy="3257549"/>
+          </a:xfrm>
+          <a:prstGeom prst="rect">
+            <a:avLst/>
+          </a:prstGeom>
+        </p:spPr>
+      </p:pic>
     </p:spTree>
     <p:extLst>
       <p:ext uri="{BB962C8B-B14F-4D97-AF65-F5344CB8AC3E}">
@@ -1039,6 +1115,102 @@
           </a:p>
         </p:txBody>
       </p:sp>
+      <p:sp>
+        <p:nvSpPr>
+          <p:cNvPr id="2" name="Rectangle 1">
+            <a:extLst>
+              <a:ext uri="{FF2B5EF4-FFF2-40B4-BE49-F238E27FC236}">
+                <a16:creationId xmlns:a16="http://schemas.microsoft.com/office/drawing/2014/main" id="{BE8E48B3-1A58-21A8-CA17-9A5BA1004412}"/>
+              </a:ext>
+            </a:extLst>
+          </p:cNvPr>
+          <p:cNvSpPr/>
+          <p:nvPr userDrawn="1"/>
+        </p:nvSpPr>
+        <p:spPr>
+          <a:xfrm>
+            <a:off x="157018" y="1126837"/>
+            <a:ext cx="11877964" cy="5209309"/>
+          </a:xfrm>
+          <a:prstGeom prst="rect">
+            <a:avLst/>
+          </a:prstGeom>
+          <a:gradFill>
+            <a:gsLst>
+              <a:gs pos="0">
+                <a:srgbClr val="FCFCFC"/>
+              </a:gs>
+              <a:gs pos="100000">
+                <a:srgbClr val="EFF3F7"/>
+              </a:gs>
+            </a:gsLst>
+            <a:lin ang="2700000" scaled="0"/>
+          </a:gradFill>
+          <a:ln>
+            <a:noFill/>
+          </a:ln>
+        </p:spPr>
+        <p:style>
+          <a:lnRef idx="2">
+            <a:schemeClr val="accent1">
+              <a:shade val="15000"/>
+            </a:schemeClr>
+          </a:lnRef>
+          <a:fillRef idx="1">
+            <a:schemeClr val="accent1"/>
+          </a:fillRef>
+          <a:effectRef idx="0">
+            <a:schemeClr val="accent1"/>
+          </a:effectRef>
+          <a:fontRef idx="minor">
+            <a:schemeClr val="lt1"/>
+          </a:fontRef>
+        </p:style>
+        <p:txBody>
+          <a:bodyPr rtlCol="0" anchor="ctr"/>
+          <a:lstStyle/>
+          <a:p>
+            <a:pPr algn="ctr"/>
+            <a:endParaRPr lang="fr-FR"/>
+          </a:p>
+        </p:txBody>
+      </p:sp>
+      <p:pic>
+        <p:nvPicPr>
+          <p:cNvPr id="3" name="Image 2" descr="Une image contenant dessin humoristique, smiley, émoticône&#10;&#10;Le contenu généré par l’IA peut être incorrect.">
+            <a:extLst>
+              <a:ext uri="{FF2B5EF4-FFF2-40B4-BE49-F238E27FC236}">
+                <a16:creationId xmlns:a16="http://schemas.microsoft.com/office/drawing/2014/main" id="{E6ADA5BB-175D-AAB9-55A7-947256658CB8}"/>
+              </a:ext>
+            </a:extLst>
+          </p:cNvPr>
+          <p:cNvPicPr>
+            <a:picLocks noChangeAspect="1"/>
+          </p:cNvPicPr>
+          <p:nvPr userDrawn="1"/>
+        </p:nvPicPr>
+        <p:blipFill>
+          <a:blip r:embed="rId2" cstate="email">
+            <a:extLst>
+              <a:ext uri="{28A0092B-C50C-407E-A947-70E740481C1C}">
+                <a14:useLocalDpi xmlns:a14="http://schemas.microsoft.com/office/drawing/2010/main"/>
+              </a:ext>
+            </a:extLst>
+          </a:blip>
+          <a:stretch>
+            <a:fillRect/>
+          </a:stretch>
+        </p:blipFill>
+        <p:spPr bwMode="auto">
+          <a:xfrm>
+            <a:off x="0" y="5839691"/>
+            <a:ext cx="1018309" cy="1018309"/>
+          </a:xfrm>
+          <a:prstGeom prst="rect">
+            <a:avLst/>
+          </a:prstGeom>
+        </p:spPr>
+      </p:pic>
     </p:spTree>
     <p:extLst>
       <p:ext uri="{BB962C8B-B14F-4D97-AF65-F5344CB8AC3E}">
@@ -1446,24 +1618,16 @@
             <a:spLocks noGrp="1"/>
           </p:cNvSpPr>
           <p:nvPr>
-            <p:ph type="ctrTitle" idx="4294967295"/>
+            <p:ph type="ctrTitle"/>
           </p:nvPr>
         </p:nvSpPr>
-        <p:spPr>
-          <a:xfrm>
-            <a:off x="2489570" y="1958975"/>
-            <a:ext cx="8674100" cy="1470025"/>
-          </a:xfrm>
-        </p:spPr>
+        <p:spPr/>
         <p:txBody>
           <a:bodyPr/>
           <a:lstStyle/>
           <a:p>
             <a:r>
-              <a:rPr dirty="0">
-                <a:latin typeface="Marianne" panose="02000000000000000000" pitchFamily="2" charset="0"/>
-              </a:rPr>
-              <a:t>PI Planning SDID – PI-10</a:t>
+              <a:t>PI Planning - Synthèse générale</a:t>
             </a:r>
           </a:p>
         </p:txBody>
@@ -1475,42 +1639,16 @@
             <a:spLocks noGrp="1"/>
           </p:cNvSpPr>
           <p:nvPr>
-            <p:ph type="subTitle" idx="4294967295"/>
+            <p:ph type="subTitle" idx="1"/>
           </p:nvPr>
         </p:nvSpPr>
-        <p:spPr>
-          <a:xfrm>
-            <a:off x="2489570" y="3859502"/>
-            <a:ext cx="8534400" cy="1752600"/>
-          </a:xfrm>
-        </p:spPr>
+        <p:spPr/>
         <p:txBody>
           <a:bodyPr/>
           <a:lstStyle/>
           <a:p>
             <a:r>
-              <a:rPr dirty="0" err="1">
-                <a:latin typeface="Marianne" panose="02000000000000000000" pitchFamily="2" charset="0"/>
-              </a:rPr>
-              <a:t>Synthèse</a:t>
-            </a:r>
-            <a:r>
-              <a:rPr dirty="0">
-                <a:latin typeface="Marianne" panose="02000000000000000000" pitchFamily="2" charset="0"/>
-              </a:rPr>
-              <a:t> </a:t>
-            </a:r>
-            <a:r>
-              <a:rPr dirty="0" err="1">
-                <a:latin typeface="Marianne" panose="02000000000000000000" pitchFamily="2" charset="0"/>
-              </a:rPr>
-              <a:t>automatique</a:t>
-            </a:r>
-            <a:r>
-              <a:rPr dirty="0">
-                <a:latin typeface="Marianne" panose="02000000000000000000" pitchFamily="2" charset="0"/>
-              </a:rPr>
-              <a:t> (équipes / epics / features / fragmentation)</a:t>
+              <a:t>Template prêt à alimenter automatiquement</a:t>
             </a:r>
           </a:p>
         </p:txBody>
@@ -1542,14 +1680,36 @@
       </p:grpSpPr>
       <p:sp>
         <p:nvSpPr>
+          <p:cNvPr id="2" name="Title 1"/>
+          <p:cNvSpPr>
+            <a:spLocks noGrp="1"/>
+          </p:cNvSpPr>
+          <p:nvPr>
+            <p:ph type="title"/>
+          </p:nvPr>
+        </p:nvSpPr>
+        <p:spPr/>
+        <p:txBody>
+          <a:bodyPr/>
+          <a:lstStyle/>
+          <a:p>
+            <a:r>
+              <a:rPr lang="fr-FR" sz="2400" dirty="0"/>
+              <a:t>VUE D'ENSEMBLE DU PI À VENIR</a:t>
+            </a:r>
+          </a:p>
+        </p:txBody>
+      </p:sp>
+      <p:sp>
+        <p:nvSpPr>
           <p:cNvPr id="3" name="TextBox 2"/>
           <p:cNvSpPr txBox="1"/>
           <p:nvPr/>
         </p:nvSpPr>
         <p:spPr>
           <a:xfrm>
-            <a:off x="2555870" y="3112867"/>
-            <a:ext cx="2739853" cy="1446550"/>
+            <a:off x="731520" y="1280160"/>
+            <a:ext cx="4206240" cy="2011680"/>
           </a:xfrm>
           <a:prstGeom prst="rect">
             <a:avLst/>
@@ -1563,39 +1723,18 @@
           <a:lstStyle/>
           <a:p>
             <a:pPr>
-              <a:defRPr sz="1800" b="1"/>
-            </a:pPr>
-            <a:r>
-              <a:rPr dirty="0" err="1">
-                <a:latin typeface="Marianne" panose="02000000000000000000" pitchFamily="2" charset="0"/>
-              </a:rPr>
-              <a:t>Indicateurs</a:t>
-            </a:r>
-            <a:r>
-              <a:rPr dirty="0">
-                <a:latin typeface="Marianne" panose="02000000000000000000" pitchFamily="2" charset="0"/>
-              </a:rPr>
-              <a:t> </a:t>
-            </a:r>
-            <a:r>
-              <a:rPr dirty="0" err="1">
-                <a:latin typeface="Marianne" panose="02000000000000000000" pitchFamily="2" charset="0"/>
-              </a:rPr>
-              <a:t>clés</a:t>
-            </a:r>
-            <a:endParaRPr dirty="0">
-              <a:latin typeface="Marianne" panose="02000000000000000000" pitchFamily="2" charset="0"/>
-            </a:endParaRPr>
+              <a:defRPr sz="2000" b="1"/>
+            </a:pPr>
+            <a:r>
+              <a:t>Informations clés PI</a:t>
+            </a:r>
           </a:p>
           <a:p>
             <a:pPr lvl="1">
               <a:defRPr sz="1400"/>
             </a:pPr>
             <a:r>
-              <a:rPr sz="1400" dirty="0">
-                <a:latin typeface="Marianne" panose="02000000000000000000" pitchFamily="2" charset="0"/>
-              </a:rPr>
-              <a:t>Équipes : 0</a:t>
+              <a:t>Nom / numéro PI</a:t>
             </a:r>
           </a:p>
           <a:p>
@@ -1603,22 +1742,7 @@
               <a:defRPr sz="1400"/>
             </a:pPr>
             <a:r>
-              <a:rPr sz="1400" dirty="0">
-                <a:latin typeface="Marianne" panose="02000000000000000000" pitchFamily="2" charset="0"/>
-              </a:rPr>
-              <a:t>Epics : 0 (</a:t>
-            </a:r>
-            <a:r>
-              <a:rPr sz="1400" dirty="0" err="1">
-                <a:latin typeface="Marianne" panose="02000000000000000000" pitchFamily="2" charset="0"/>
-              </a:rPr>
-              <a:t>séparées</a:t>
-            </a:r>
-            <a:r>
-              <a:rPr sz="1400" dirty="0">
-                <a:latin typeface="Marianne" panose="02000000000000000000" pitchFamily="2" charset="0"/>
-              </a:rPr>
-              <a:t> : 0)</a:t>
+              <a:t>Période</a:t>
             </a:r>
           </a:p>
           <a:p>
@@ -1626,32 +1750,7 @@
               <a:defRPr sz="1400"/>
             </a:pPr>
             <a:r>
-              <a:rPr sz="1400" dirty="0">
-                <a:latin typeface="Marianne" panose="02000000000000000000" pitchFamily="2" charset="0"/>
-              </a:rPr>
-              <a:t>Features (PI) : 0</a:t>
-            </a:r>
-          </a:p>
-          <a:p>
-            <a:pPr lvl="1">
-              <a:defRPr sz="1400"/>
-            </a:pPr>
-            <a:r>
-              <a:rPr sz="1400" dirty="0">
-                <a:latin typeface="Marianne" panose="02000000000000000000" pitchFamily="2" charset="0"/>
-              </a:rPr>
-              <a:t>Agents multi-équipes : 0</a:t>
-            </a:r>
-          </a:p>
-          <a:p>
-            <a:pPr lvl="1">
-              <a:defRPr sz="1400"/>
-            </a:pPr>
-            <a:r>
-              <a:rPr sz="1400" dirty="0">
-                <a:latin typeface="Marianne" panose="02000000000000000000" pitchFamily="2" charset="0"/>
-              </a:rPr>
-              <a:t>Agents &gt;100% : 0</a:t>
+              <a:t>Objectif global</a:t>
             </a:r>
           </a:p>
         </p:txBody>
@@ -1664,8 +1763,8 @@
         </p:nvSpPr>
         <p:spPr>
           <a:xfrm>
-            <a:off x="2622616" y="5188721"/>
-            <a:ext cx="4911922" cy="584775"/>
+            <a:off x="4572000" y="1280160"/>
+            <a:ext cx="3931920" cy="2011680"/>
           </a:xfrm>
           <a:prstGeom prst="rect">
             <a:avLst/>
@@ -1679,13 +1778,10 @@
           <a:lstStyle/>
           <a:p>
             <a:pPr>
-              <a:defRPr sz="1800" b="1"/>
-            </a:pPr>
-            <a:r>
-              <a:rPr dirty="0">
-                <a:latin typeface="Marianne" panose="02000000000000000000" pitchFamily="2" charset="0"/>
-              </a:rPr>
-              <a:t>Ambition PI (extraits)</a:t>
+              <a:defRPr sz="2000" b="1"/>
+            </a:pPr>
+            <a:r>
+              <a:t>Statistiques</a:t>
             </a:r>
           </a:p>
           <a:p>
@@ -1693,60 +1789,37 @@
               <a:defRPr sz="1400"/>
             </a:pPr>
             <a:r>
-              <a:rPr sz="1400" dirty="0" err="1">
-                <a:latin typeface="Marianne" panose="02000000000000000000" pitchFamily="2" charset="0"/>
-              </a:rPr>
-              <a:t>Aucune</a:t>
-            </a:r>
-            <a:r>
-              <a:rPr sz="1400" dirty="0">
-                <a:latin typeface="Marianne" panose="02000000000000000000" pitchFamily="2" charset="0"/>
-              </a:rPr>
-              <a:t> epic </a:t>
-            </a:r>
-            <a:r>
-              <a:rPr sz="1400" dirty="0" err="1">
-                <a:latin typeface="Marianne" panose="02000000000000000000" pitchFamily="2" charset="0"/>
-              </a:rPr>
-              <a:t>détectée</a:t>
-            </a:r>
-            <a:r>
-              <a:rPr sz="1400" dirty="0">
-                <a:latin typeface="Marianne" panose="02000000000000000000" pitchFamily="2" charset="0"/>
-              </a:rPr>
-              <a:t> pour </a:t>
-            </a:r>
-            <a:r>
-              <a:rPr sz="1400" dirty="0" err="1">
-                <a:latin typeface="Marianne" panose="02000000000000000000" pitchFamily="2" charset="0"/>
-              </a:rPr>
-              <a:t>ce</a:t>
-            </a:r>
-            <a:r>
-              <a:rPr sz="1400" dirty="0">
-                <a:latin typeface="Marianne" panose="02000000000000000000" pitchFamily="2" charset="0"/>
-              </a:rPr>
-              <a:t> PI / template vide.</a:t>
+              <a:t>Nombre d'équipes</a:t>
+            </a:r>
+          </a:p>
+          <a:p>
+            <a:pPr lvl="1">
+              <a:defRPr sz="1400"/>
+            </a:pPr>
+            <a:r>
+              <a:t>Nombre d'epics</a:t>
+            </a:r>
+          </a:p>
+          <a:p>
+            <a:pPr lvl="1">
+              <a:defRPr sz="1400"/>
+            </a:pPr>
+            <a:r>
+              <a:t>Nombre de features</a:t>
             </a:r>
           </a:p>
         </p:txBody>
       </p:sp>
       <p:sp>
         <p:nvSpPr>
-          <p:cNvPr id="6" name="ZoneTexte 5">
-            <a:extLst>
-              <a:ext uri="{FF2B5EF4-FFF2-40B4-BE49-F238E27FC236}">
-                <a16:creationId xmlns:a16="http://schemas.microsoft.com/office/drawing/2014/main" id="{30EC3E73-196C-A30A-BE46-CACA9FC5945B}"/>
-              </a:ext>
-            </a:extLst>
-          </p:cNvPr>
+          <p:cNvPr id="5" name="TextBox 4"/>
           <p:cNvSpPr txBox="1"/>
           <p:nvPr/>
         </p:nvSpPr>
         <p:spPr>
           <a:xfrm>
-            <a:off x="2696033" y="446526"/>
-            <a:ext cx="6097112" cy="369332"/>
+            <a:off x="731519" y="2654104"/>
+            <a:ext cx="11055320" cy="3523672"/>
           </a:xfrm>
           <a:prstGeom prst="rect">
             <a:avLst/>
@@ -1755,18 +1828,65 @@
         </p:spPr>
         <p:txBody>
           <a:bodyPr wrap="square">
-            <a:spAutoFit/>
+            <a:noAutofit/>
           </a:bodyPr>
           <a:lstStyle/>
           <a:p>
-            <a:r>
-              <a:rPr lang="fr-FR" b="1" dirty="0">
-                <a:solidFill>
-                  <a:srgbClr val="0070C0"/>
-                </a:solidFill>
-                <a:latin typeface="Marianne" panose="02000000000000000000" pitchFamily="2" charset="0"/>
-              </a:rPr>
-              <a:t>PLANCHE DE SYNTHÈSE</a:t>
+            <a:pPr>
+              <a:defRPr sz="2000" b="1"/>
+            </a:pPr>
+            <a:r>
+              <a:rPr dirty="0"/>
+              <a:t>Population </a:t>
+            </a:r>
+            <a:r>
+              <a:rPr dirty="0" err="1"/>
+              <a:t>d'agents</a:t>
+            </a:r>
+            <a:endParaRPr dirty="0"/>
+          </a:p>
+          <a:p>
+            <a:pPr lvl="1">
+              <a:defRPr sz="1400"/>
+            </a:pPr>
+            <a:r>
+              <a:rPr dirty="0"/>
+              <a:t>Nombre total </a:t>
+            </a:r>
+            <a:r>
+              <a:rPr dirty="0" err="1"/>
+              <a:t>d'agents</a:t>
+            </a:r>
+            <a:endParaRPr dirty="0"/>
+          </a:p>
+          <a:p>
+            <a:pPr lvl="1">
+              <a:defRPr sz="1400"/>
+            </a:pPr>
+            <a:r>
+              <a:rPr dirty="0" err="1"/>
+              <a:t>Répartition</a:t>
+            </a:r>
+            <a:r>
+              <a:rPr dirty="0"/>
+              <a:t> par équipe</a:t>
+            </a:r>
+          </a:p>
+          <a:p>
+            <a:pPr lvl="1">
+              <a:defRPr sz="1400"/>
+            </a:pPr>
+            <a:r>
+              <a:rPr dirty="0"/>
+              <a:t>Charge </a:t>
+            </a:r>
+            <a:r>
+              <a:rPr dirty="0" err="1"/>
+              <a:t>agrégée</a:t>
+            </a:r>
+            <a:r>
+              <a:rPr dirty="0"/>
+              <a:t> (%)</a:t>
             </a:r>
           </a:p>
         </p:txBody>
@@ -1808,28 +1928,12 @@
         </p:nvSpPr>
         <p:spPr/>
         <p:txBody>
-          <a:bodyPr>
-            <a:normAutofit/>
-          </a:bodyPr>
+          <a:bodyPr/>
           <a:lstStyle/>
           <a:p>
             <a:r>
-              <a:rPr dirty="0">
-                <a:latin typeface="Marianne" panose="02000000000000000000" pitchFamily="2" charset="0"/>
-              </a:rPr>
-              <a:t>Vue </a:t>
-            </a:r>
-            <a:r>
-              <a:rPr dirty="0" err="1">
-                <a:latin typeface="Marianne" panose="02000000000000000000" pitchFamily="2" charset="0"/>
-              </a:rPr>
-              <a:t>organisationnelle</a:t>
-            </a:r>
-            <a:r>
-              <a:rPr dirty="0">
-                <a:latin typeface="Marianne" panose="02000000000000000000" pitchFamily="2" charset="0"/>
-              </a:rPr>
-              <a:t> (équipes → epics → features)</a:t>
+              <a:rPr lang="fr-FR" sz="2400" dirty="0"/>
+              <a:t>AGENTS AVEC FRAGMENTATION D'AFFECTATION</a:t>
             </a:r>
           </a:p>
         </p:txBody>
@@ -1842,8 +1946,169 @@
         </p:nvSpPr>
         <p:spPr>
           <a:xfrm>
-            <a:off x="2248846" y="2057068"/>
-            <a:ext cx="1244251" cy="584775"/>
+            <a:off x="1606062" y="691376"/>
+            <a:ext cx="10269986" cy="479502"/>
+          </a:xfrm>
+          <a:prstGeom prst="rect">
+            <a:avLst/>
+          </a:prstGeom>
+          <a:noFill/>
+        </p:spPr>
+        <p:txBody>
+          <a:bodyPr wrap="none">
+            <a:noAutofit/>
+          </a:bodyPr>
+          <a:lstStyle/>
+          <a:p>
+            <a:pPr>
+              <a:defRPr sz="2000" b="1"/>
+            </a:pPr>
+            <a:r>
+              <a:rPr dirty="0"/>
+              <a:t>Critères de fragmentation</a:t>
+            </a:r>
+            <a:r>
+              <a:rPr lang="fr-FR" dirty="0"/>
+              <a:t> : </a:t>
+            </a:r>
+            <a:r>
+              <a:rPr dirty="0"/>
+              <a:t>Multi-équipes</a:t>
+            </a:r>
+            <a:r>
+              <a:rPr lang="fr-FR" dirty="0"/>
+              <a:t> </a:t>
+            </a:r>
+            <a:r>
+              <a:rPr dirty="0"/>
+              <a:t>Multi-epics</a:t>
+            </a:r>
+            <a:r>
+              <a:rPr lang="fr-FR" dirty="0"/>
+              <a:t> </a:t>
+            </a:r>
+            <a:r>
+              <a:rPr dirty="0"/>
+              <a:t>Charge </a:t>
+            </a:r>
+            <a:r>
+              <a:rPr dirty="0" err="1"/>
+              <a:t>totale</a:t>
+            </a:r>
+            <a:r>
+              <a:rPr dirty="0"/>
+              <a:t> &gt; 100%</a:t>
+            </a:r>
+          </a:p>
+        </p:txBody>
+      </p:sp>
+      <p:sp>
+        <p:nvSpPr>
+          <p:cNvPr id="4" name="TextBox 3"/>
+          <p:cNvSpPr txBox="1"/>
+          <p:nvPr/>
+        </p:nvSpPr>
+        <p:spPr>
+          <a:xfrm>
+            <a:off x="345316" y="1322712"/>
+            <a:ext cx="11530732" cy="4843911"/>
+          </a:xfrm>
+          <a:prstGeom prst="rect">
+            <a:avLst/>
+          </a:prstGeom>
+          <a:noFill/>
+        </p:spPr>
+        <p:txBody>
+          <a:bodyPr wrap="square">
+            <a:noAutofit/>
+          </a:bodyPr>
+          <a:lstStyle/>
+          <a:p>
+            <a:pPr>
+              <a:defRPr sz="2000" b="1"/>
+            </a:pPr>
+            <a:r>
+              <a:rPr dirty="0" err="1"/>
+              <a:t>Liste</a:t>
+            </a:r>
+            <a:r>
+              <a:rPr dirty="0"/>
+              <a:t> des agents </a:t>
+            </a:r>
+            <a:r>
+              <a:rPr dirty="0" err="1"/>
+              <a:t>concernés</a:t>
+            </a:r>
+            <a:endParaRPr dirty="0"/>
+          </a:p>
+          <a:p>
+            <a:pPr lvl="1">
+              <a:defRPr sz="1400"/>
+            </a:pPr>
+            <a:r>
+              <a:rPr dirty="0"/>
+              <a:t>Nom agent - équipe(s) - epic(s) - charge (%)</a:t>
+            </a:r>
+          </a:p>
+        </p:txBody>
+      </p:sp>
+    </p:spTree>
+  </p:cSld>
+  <p:clrMapOvr>
+    <a:masterClrMapping/>
+  </p:clrMapOvr>
+</p:sld>
+</file>
+
+<file path=ppt/slides/slide4.xml><?xml version="1.0" encoding="utf-8"?>
+<p:sld xmlns:a="http://schemas.openxmlformats.org/drawingml/2006/main" xmlns:r="http://schemas.openxmlformats.org/officeDocument/2006/relationships" xmlns:p="http://schemas.openxmlformats.org/presentationml/2006/main">
+  <p:cSld>
+    <p:spTree>
+      <p:nvGrpSpPr>
+        <p:cNvPr id="1" name=""/>
+        <p:cNvGrpSpPr/>
+        <p:nvPr/>
+      </p:nvGrpSpPr>
+      <p:grpSpPr>
+        <a:xfrm>
+          <a:off x="0" y="0"/>
+          <a:ext cx="0" cy="0"/>
+          <a:chOff x="0" y="0"/>
+          <a:chExt cx="0" cy="0"/>
+        </a:xfrm>
+      </p:grpSpPr>
+      <p:sp>
+        <p:nvSpPr>
+          <p:cNvPr id="2" name="Title 1"/>
+          <p:cNvSpPr>
+            <a:spLocks noGrp="1"/>
+          </p:cNvSpPr>
+          <p:nvPr>
+            <p:ph type="title"/>
+          </p:nvPr>
+        </p:nvSpPr>
+        <p:spPr/>
+        <p:txBody>
+          <a:bodyPr/>
+          <a:lstStyle/>
+          <a:p>
+            <a:r>
+              <a:rPr lang="fr-FR" sz="2400" dirty="0"/>
+              <a:t>AGENTS AVEC FAIBLE AFFECTATION (&lt;10%)</a:t>
+            </a:r>
+          </a:p>
+        </p:txBody>
+      </p:sp>
+      <p:sp>
+        <p:nvSpPr>
+          <p:cNvPr id="3" name="TextBox 2"/>
+          <p:cNvSpPr txBox="1"/>
+          <p:nvPr/>
+        </p:nvSpPr>
+        <p:spPr>
+          <a:xfrm>
+            <a:off x="731520" y="1280160"/>
+            <a:ext cx="7772400" cy="1645920"/>
           </a:xfrm>
           <a:prstGeom prst="rect">
             <a:avLst/>
@@ -1857,13 +2122,10 @@
           <a:lstStyle/>
           <a:p>
             <a:pPr>
-              <a:defRPr sz="1800" b="1"/>
-            </a:pPr>
-            <a:r>
-              <a:rPr dirty="0">
-                <a:latin typeface="Marianne" panose="02000000000000000000" pitchFamily="2" charset="0"/>
-              </a:rPr>
-              <a:t>Structure</a:t>
+              <a:defRPr sz="2000" b="1"/>
+            </a:pPr>
+            <a:r>
+              <a:t>Périmètre</a:t>
             </a:r>
           </a:p>
           <a:p>
@@ -1871,10 +2133,566 @@
               <a:defRPr sz="1400"/>
             </a:pPr>
             <a:r>
-              <a:rPr sz="1400" dirty="0">
-                <a:latin typeface="Marianne" panose="02000000000000000000" pitchFamily="2" charset="0"/>
-              </a:rPr>
-              <a:t>—</a:t>
+              <a:t>Agents dont la charge totale est strictement inférieure à 10%</a:t>
+            </a:r>
+          </a:p>
+        </p:txBody>
+      </p:sp>
+      <p:sp>
+        <p:nvSpPr>
+          <p:cNvPr id="4" name="TextBox 3"/>
+          <p:cNvSpPr txBox="1"/>
+          <p:nvPr/>
+        </p:nvSpPr>
+        <p:spPr>
+          <a:xfrm>
+            <a:off x="731520" y="3017519"/>
+            <a:ext cx="11155680" cy="3227163"/>
+          </a:xfrm>
+          <a:prstGeom prst="rect">
+            <a:avLst/>
+          </a:prstGeom>
+          <a:noFill/>
+        </p:spPr>
+        <p:txBody>
+          <a:bodyPr wrap="none">
+            <a:noAutofit/>
+          </a:bodyPr>
+          <a:lstStyle/>
+          <a:p>
+            <a:pPr>
+              <a:defRPr sz="2000" b="1"/>
+            </a:pPr>
+            <a:r>
+              <a:rPr dirty="0" err="1"/>
+              <a:t>Liste</a:t>
+            </a:r>
+            <a:r>
+              <a:rPr dirty="0"/>
+              <a:t> des agents </a:t>
+            </a:r>
+            <a:r>
+              <a:rPr dirty="0" err="1"/>
+              <a:t>concernés</a:t>
+            </a:r>
+            <a:endParaRPr dirty="0"/>
+          </a:p>
+          <a:p>
+            <a:pPr lvl="1">
+              <a:defRPr sz="1400"/>
+            </a:pPr>
+            <a:r>
+              <a:rPr dirty="0"/>
+              <a:t>Nom agent - équipe </a:t>
+            </a:r>
+            <a:r>
+              <a:rPr dirty="0" err="1"/>
+              <a:t>principale</a:t>
+            </a:r>
+            <a:r>
+              <a:rPr dirty="0"/>
+              <a:t> - charge (%)</a:t>
+            </a:r>
+          </a:p>
+        </p:txBody>
+      </p:sp>
+    </p:spTree>
+  </p:cSld>
+  <p:clrMapOvr>
+    <a:masterClrMapping/>
+  </p:clrMapOvr>
+</p:sld>
+</file>
+
+<file path=ppt/slides/slide5.xml><?xml version="1.0" encoding="utf-8"?>
+<p:sld xmlns:a="http://schemas.openxmlformats.org/drawingml/2006/main" xmlns:r="http://schemas.openxmlformats.org/officeDocument/2006/relationships" xmlns:p="http://schemas.openxmlformats.org/presentationml/2006/main">
+  <p:cSld>
+    <p:spTree>
+      <p:nvGrpSpPr>
+        <p:cNvPr id="1" name=""/>
+        <p:cNvGrpSpPr/>
+        <p:nvPr/>
+      </p:nvGrpSpPr>
+      <p:grpSpPr>
+        <a:xfrm>
+          <a:off x="0" y="0"/>
+          <a:ext cx="0" cy="0"/>
+          <a:chOff x="0" y="0"/>
+          <a:chExt cx="0" cy="0"/>
+        </a:xfrm>
+      </p:grpSpPr>
+      <p:sp>
+        <p:nvSpPr>
+          <p:cNvPr id="2" name="Title 1"/>
+          <p:cNvSpPr>
+            <a:spLocks noGrp="1"/>
+          </p:cNvSpPr>
+          <p:nvPr>
+            <p:ph type="title"/>
+          </p:nvPr>
+        </p:nvSpPr>
+        <p:spPr/>
+        <p:txBody>
+          <a:bodyPr/>
+          <a:lstStyle/>
+          <a:p>
+            <a:r>
+              <a:rPr lang="fr-FR" sz="2400" dirty="0"/>
+              <a:t>ÉQUIPE - [NOM ÉQUIPE]</a:t>
+            </a:r>
+          </a:p>
+        </p:txBody>
+      </p:sp>
+      <p:sp>
+        <p:nvSpPr>
+          <p:cNvPr id="3" name="TextBox 2"/>
+          <p:cNvSpPr txBox="1"/>
+          <p:nvPr/>
+        </p:nvSpPr>
+        <p:spPr>
+          <a:xfrm>
+            <a:off x="731520" y="1280160"/>
+            <a:ext cx="4206240" cy="2011680"/>
+          </a:xfrm>
+          <a:prstGeom prst="rect">
+            <a:avLst/>
+          </a:prstGeom>
+          <a:noFill/>
+        </p:spPr>
+        <p:txBody>
+          <a:bodyPr wrap="none">
+            <a:spAutoFit/>
+          </a:bodyPr>
+          <a:lstStyle/>
+          <a:p>
+            <a:pPr>
+              <a:defRPr sz="2000" b="1"/>
+            </a:pPr>
+            <a:r>
+              <a:t>Identité d'équipe</a:t>
+            </a:r>
+          </a:p>
+          <a:p>
+            <a:pPr lvl="1">
+              <a:defRPr sz="1400"/>
+            </a:pPr>
+            <a:r>
+              <a:t>PM / PO</a:t>
+            </a:r>
+          </a:p>
+          <a:p>
+            <a:pPr lvl="1">
+              <a:defRPr sz="1400"/>
+            </a:pPr>
+            <a:r>
+              <a:t>Nombre d'agents</a:t>
+            </a:r>
+          </a:p>
+          <a:p>
+            <a:pPr lvl="1">
+              <a:defRPr sz="1400"/>
+            </a:pPr>
+            <a:r>
+              <a:t>Epics associées</a:t>
+            </a:r>
+          </a:p>
+        </p:txBody>
+      </p:sp>
+      <p:sp>
+        <p:nvSpPr>
+          <p:cNvPr id="4" name="TextBox 3"/>
+          <p:cNvSpPr txBox="1"/>
+          <p:nvPr/>
+        </p:nvSpPr>
+        <p:spPr>
+          <a:xfrm>
+            <a:off x="4572000" y="1280160"/>
+            <a:ext cx="3931920" cy="2011680"/>
+          </a:xfrm>
+          <a:prstGeom prst="rect">
+            <a:avLst/>
+          </a:prstGeom>
+          <a:noFill/>
+        </p:spPr>
+        <p:txBody>
+          <a:bodyPr wrap="none">
+            <a:spAutoFit/>
+          </a:bodyPr>
+          <a:lstStyle/>
+          <a:p>
+            <a:pPr>
+              <a:defRPr sz="2000" b="1"/>
+            </a:pPr>
+            <a:r>
+              <a:t>Contexte</a:t>
+            </a:r>
+          </a:p>
+          <a:p>
+            <a:pPr lvl="1">
+              <a:defRPr sz="1400"/>
+            </a:pPr>
+            <a:r>
+              <a:t>Points de vigilance</a:t>
+            </a:r>
+          </a:p>
+          <a:p>
+            <a:pPr lvl="1">
+              <a:defRPr sz="1400"/>
+            </a:pPr>
+            <a:r>
+              <a:t>Dépendances majeures</a:t>
+            </a:r>
+          </a:p>
+        </p:txBody>
+      </p:sp>
+      <p:sp>
+        <p:nvSpPr>
+          <p:cNvPr id="5" name="TextBox 4"/>
+          <p:cNvSpPr txBox="1"/>
+          <p:nvPr/>
+        </p:nvSpPr>
+        <p:spPr>
+          <a:xfrm>
+            <a:off x="731520" y="2654104"/>
+            <a:ext cx="11122226" cy="3512519"/>
+          </a:xfrm>
+          <a:prstGeom prst="rect">
+            <a:avLst/>
+          </a:prstGeom>
+          <a:noFill/>
+        </p:spPr>
+        <p:txBody>
+          <a:bodyPr wrap="none">
+            <a:noAutofit/>
+          </a:bodyPr>
+          <a:lstStyle/>
+          <a:p>
+            <a:pPr>
+              <a:defRPr sz="2000" b="1"/>
+            </a:pPr>
+            <a:r>
+              <a:t>Synthèse équipe</a:t>
+            </a:r>
+          </a:p>
+          <a:p>
+            <a:pPr lvl="1">
+              <a:defRPr sz="1400"/>
+            </a:pPr>
+            <a:r>
+              <a:t>Résumé exécutable sur le PI</a:t>
+            </a:r>
+          </a:p>
+        </p:txBody>
+      </p:sp>
+    </p:spTree>
+  </p:cSld>
+  <p:clrMapOvr>
+    <a:masterClrMapping/>
+  </p:clrMapOvr>
+</p:sld>
+</file>
+
+<file path=ppt/slides/slide6.xml><?xml version="1.0" encoding="utf-8"?>
+<p:sld xmlns:a="http://schemas.openxmlformats.org/drawingml/2006/main" xmlns:r="http://schemas.openxmlformats.org/officeDocument/2006/relationships" xmlns:p="http://schemas.openxmlformats.org/presentationml/2006/main">
+  <p:cSld>
+    <p:spTree>
+      <p:nvGrpSpPr>
+        <p:cNvPr id="1" name=""/>
+        <p:cNvGrpSpPr/>
+        <p:nvPr/>
+      </p:nvGrpSpPr>
+      <p:grpSpPr>
+        <a:xfrm>
+          <a:off x="0" y="0"/>
+          <a:ext cx="0" cy="0"/>
+          <a:chOff x="0" y="0"/>
+          <a:chExt cx="0" cy="0"/>
+        </a:xfrm>
+      </p:grpSpPr>
+      <p:sp>
+        <p:nvSpPr>
+          <p:cNvPr id="2" name="Title 1"/>
+          <p:cNvSpPr>
+            <a:spLocks noGrp="1"/>
+          </p:cNvSpPr>
+          <p:nvPr>
+            <p:ph type="title"/>
+          </p:nvPr>
+        </p:nvSpPr>
+        <p:spPr>
+          <a:xfrm>
+            <a:off x="1606062" y="245033"/>
+            <a:ext cx="9120553" cy="631337"/>
+          </a:xfrm>
+        </p:spPr>
+        <p:txBody>
+          <a:bodyPr/>
+          <a:lstStyle/>
+          <a:p>
+            <a:r>
+              <a:rPr lang="fr-FR" sz="2000" dirty="0"/>
+              <a:t>FINALITÉS ET AMBITION DU PIP - [NOM ÉQUIPE / EPIC]</a:t>
+            </a:r>
+          </a:p>
+        </p:txBody>
+      </p:sp>
+      <p:sp>
+        <p:nvSpPr>
+          <p:cNvPr id="3" name="TextBox 2"/>
+          <p:cNvSpPr txBox="1"/>
+          <p:nvPr/>
+        </p:nvSpPr>
+        <p:spPr>
+          <a:xfrm>
+            <a:off x="731520" y="1280159"/>
+            <a:ext cx="11267192" cy="1797577"/>
+          </a:xfrm>
+          <a:prstGeom prst="rect">
+            <a:avLst/>
+          </a:prstGeom>
+          <a:noFill/>
+        </p:spPr>
+        <p:txBody>
+          <a:bodyPr wrap="square">
+            <a:noAutofit/>
+          </a:bodyPr>
+          <a:lstStyle/>
+          <a:p>
+            <a:pPr>
+              <a:defRPr sz="2000" b="1"/>
+            </a:pPr>
+            <a:r>
+              <a:t>Finalités</a:t>
+            </a:r>
+          </a:p>
+          <a:p>
+            <a:pPr lvl="1">
+              <a:defRPr sz="1400"/>
+            </a:pPr>
+            <a:r>
+              <a:t>Pourquoi</a:t>
+            </a:r>
+          </a:p>
+          <a:p>
+            <a:pPr lvl="1">
+              <a:defRPr sz="1400"/>
+            </a:pPr>
+            <a:r>
+              <a:t>Valeur attendue</a:t>
+            </a:r>
+          </a:p>
+          <a:p>
+            <a:pPr lvl="1">
+              <a:defRPr sz="1400"/>
+            </a:pPr>
+            <a:r>
+              <a:t>Bénéfices métier</a:t>
+            </a:r>
+          </a:p>
+        </p:txBody>
+      </p:sp>
+      <p:sp>
+        <p:nvSpPr>
+          <p:cNvPr id="4" name="TextBox 3"/>
+          <p:cNvSpPr txBox="1"/>
+          <p:nvPr/>
+        </p:nvSpPr>
+        <p:spPr>
+          <a:xfrm>
+            <a:off x="731520" y="3278459"/>
+            <a:ext cx="11155681" cy="3010828"/>
+          </a:xfrm>
+          <a:prstGeom prst="rect">
+            <a:avLst/>
+          </a:prstGeom>
+          <a:noFill/>
+        </p:spPr>
+        <p:txBody>
+          <a:bodyPr wrap="square">
+            <a:noAutofit/>
+          </a:bodyPr>
+          <a:lstStyle/>
+          <a:p>
+            <a:pPr>
+              <a:defRPr sz="2000" b="1"/>
+            </a:pPr>
+            <a:r>
+              <a:rPr dirty="0"/>
+              <a:t>Ambition du PIP</a:t>
+            </a:r>
+          </a:p>
+          <a:p>
+            <a:pPr lvl="1">
+              <a:defRPr sz="1400"/>
+            </a:pPr>
+            <a:r>
+              <a:rPr dirty="0" err="1"/>
+              <a:t>Résultat</a:t>
+            </a:r>
+            <a:r>
+              <a:rPr dirty="0"/>
+              <a:t> </a:t>
+            </a:r>
+            <a:r>
+              <a:rPr dirty="0" err="1"/>
+              <a:t>cible</a:t>
+            </a:r>
+            <a:r>
+              <a:rPr dirty="0"/>
+              <a:t> du PI</a:t>
+            </a:r>
+          </a:p>
+          <a:p>
+            <a:pPr lvl="1">
+              <a:defRPr sz="1400"/>
+            </a:pPr>
+            <a:r>
+              <a:rPr dirty="0"/>
+              <a:t>Critères de succès</a:t>
+            </a:r>
+          </a:p>
+        </p:txBody>
+      </p:sp>
+    </p:spTree>
+  </p:cSld>
+  <p:clrMapOvr>
+    <a:masterClrMapping/>
+  </p:clrMapOvr>
+</p:sld>
+</file>
+
+<file path=ppt/slides/slide7.xml><?xml version="1.0" encoding="utf-8"?>
+<p:sld xmlns:a="http://schemas.openxmlformats.org/drawingml/2006/main" xmlns:r="http://schemas.openxmlformats.org/officeDocument/2006/relationships" xmlns:p="http://schemas.openxmlformats.org/presentationml/2006/main">
+  <p:cSld>
+    <p:spTree>
+      <p:nvGrpSpPr>
+        <p:cNvPr id="1" name=""/>
+        <p:cNvGrpSpPr/>
+        <p:nvPr/>
+      </p:nvGrpSpPr>
+      <p:grpSpPr>
+        <a:xfrm>
+          <a:off x="0" y="0"/>
+          <a:ext cx="0" cy="0"/>
+          <a:chOff x="0" y="0"/>
+          <a:chExt cx="0" cy="0"/>
+        </a:xfrm>
+      </p:grpSpPr>
+      <p:sp>
+        <p:nvSpPr>
+          <p:cNvPr id="2" name="Title 1"/>
+          <p:cNvSpPr>
+            <a:spLocks noGrp="1"/>
+          </p:cNvSpPr>
+          <p:nvPr>
+            <p:ph type="title"/>
+          </p:nvPr>
+        </p:nvSpPr>
+        <p:spPr>
+          <a:xfrm>
+            <a:off x="1726779" y="245034"/>
+            <a:ext cx="9120553" cy="631337"/>
+          </a:xfrm>
+        </p:spPr>
+        <p:txBody>
+          <a:bodyPr/>
+          <a:lstStyle/>
+          <a:p>
+            <a:r>
+              <a:rPr lang="fr-FR" sz="2000" dirty="0"/>
+              <a:t>FEATURES - [NOM ÉQUIPE / EPIC]</a:t>
+            </a:r>
+          </a:p>
+        </p:txBody>
+      </p:sp>
+      <p:sp>
+        <p:nvSpPr>
+          <p:cNvPr id="3" name="TextBox 2"/>
+          <p:cNvSpPr txBox="1"/>
+          <p:nvPr/>
+        </p:nvSpPr>
+        <p:spPr>
+          <a:xfrm>
+            <a:off x="731519" y="1280160"/>
+            <a:ext cx="11111075" cy="4841860"/>
+          </a:xfrm>
+          <a:prstGeom prst="rect">
+            <a:avLst/>
+          </a:prstGeom>
+          <a:noFill/>
+        </p:spPr>
+        <p:txBody>
+          <a:bodyPr wrap="none">
+            <a:noAutofit/>
+          </a:bodyPr>
+          <a:lstStyle/>
+          <a:p>
+            <a:pPr>
+              <a:defRPr sz="2000" b="1"/>
+            </a:pPr>
+            <a:r>
+              <a:rPr dirty="0"/>
+              <a:t>Backlog features PI</a:t>
+            </a:r>
+          </a:p>
+          <a:p>
+            <a:pPr lvl="1">
+              <a:defRPr sz="1400"/>
+            </a:pPr>
+            <a:r>
+              <a:rPr dirty="0"/>
+              <a:t>Feature 1 - </a:t>
+            </a:r>
+            <a:r>
+              <a:rPr dirty="0" err="1"/>
+              <a:t>statut</a:t>
+            </a:r>
+            <a:r>
+              <a:rPr dirty="0"/>
+              <a:t> - owner</a:t>
+            </a:r>
+          </a:p>
+          <a:p>
+            <a:pPr lvl="1">
+              <a:defRPr sz="1400"/>
+            </a:pPr>
+            <a:r>
+              <a:rPr dirty="0"/>
+              <a:t>Feature 2 - </a:t>
+            </a:r>
+            <a:r>
+              <a:rPr dirty="0" err="1"/>
+              <a:t>statut</a:t>
+            </a:r>
+            <a:r>
+              <a:rPr dirty="0"/>
+              <a:t> - owner</a:t>
+            </a:r>
+          </a:p>
+          <a:p>
+            <a:pPr lvl="1">
+              <a:defRPr sz="1400"/>
+            </a:pPr>
+            <a:r>
+              <a:rPr dirty="0"/>
+              <a:t>Feature 3 - </a:t>
+            </a:r>
+            <a:r>
+              <a:rPr dirty="0" err="1"/>
+              <a:t>statut</a:t>
+            </a:r>
+            <a:r>
+              <a:rPr dirty="0"/>
+              <a:t> - owner</a:t>
+            </a:r>
+          </a:p>
+          <a:p>
+            <a:pPr lvl="1">
+              <a:defRPr sz="1400"/>
+            </a:pPr>
+            <a:r>
+              <a:rPr dirty="0"/>
+              <a:t>...</a:t>
             </a:r>
           </a:p>
         </p:txBody>

</xml_diff>